<commit_message>
Updated slides with latest changes.
</commit_message>
<xml_diff>
--- a/docs/SoNet.pptx
+++ b/docs/SoNet.pptx
@@ -107,7 +107,49 @@
       </a:defRPr>
     </a:lvl9pPr>
   </p:defaultTextStyle>
+  <p:extLst>
+    <p:ext uri="{EFAFB233-063F-42B5-8137-9DF3F51BA10A}">
+      <p15:sldGuideLst xmlns:p15="http://schemas.microsoft.com/office/powerpoint/2012/main"/>
+    </p:ext>
+  </p:extLst>
 </p:presentation>
+</file>
+
+<file path=ppt/revisionInfo.xml><?xml version="1.0" encoding="utf-8"?>
+<p1510:revInfo xmlns:a="http://schemas.openxmlformats.org/drawingml/2006/main" xmlns:r="http://schemas.openxmlformats.org/officeDocument/2006/relationships" xmlns:p1510="http://schemas.microsoft.com/office/powerpoint/2015/10/main">
+  <p1510:revLst>
+    <p1510:client id="{0CEF096C-5FA2-41B3-85F1-F18770715A83}" v="7" dt="2019-12-18T05:50:30.314"/>
+  </p1510:revLst>
+</p1510:revInfo>
+</file>
+
+<file path=ppt/changesInfos/changesInfo1.xml><?xml version="1.0" encoding="utf-8"?>
+<pc:chgInfo xmlns:a="http://schemas.openxmlformats.org/drawingml/2006/main" xmlns:r="http://schemas.openxmlformats.org/officeDocument/2006/relationships" xmlns:ac="http://schemas.microsoft.com/office/drawing/2013/main/command" xmlns:pc="http://schemas.microsoft.com/office/powerpoint/2013/main/command">
+  <pc:docChgLst>
+    <pc:chgData name="Jonathan Getachew" userId="59136f738c513e52" providerId="LiveId" clId="{0CEF096C-5FA2-41B3-85F1-F18770715A83}"/>
+    <pc:docChg chg="custSel modSld">
+      <pc:chgData name="Jonathan Getachew" userId="59136f738c513e52" providerId="LiveId" clId="{0CEF096C-5FA2-41B3-85F1-F18770715A83}" dt="2019-12-18T05:50:30.314" v="6" actId="20577"/>
+      <pc:docMkLst>
+        <pc:docMk/>
+      </pc:docMkLst>
+      <pc:sldChg chg="modSp modAnim">
+        <pc:chgData name="Jonathan Getachew" userId="59136f738c513e52" providerId="LiveId" clId="{0CEF096C-5FA2-41B3-85F1-F18770715A83}" dt="2019-12-18T05:50:30.314" v="6" actId="20577"/>
+        <pc:sldMkLst>
+          <pc:docMk/>
+          <pc:sldMk cId="4087603957" sldId="258"/>
+        </pc:sldMkLst>
+        <pc:spChg chg="mod">
+          <ac:chgData name="Jonathan Getachew" userId="59136f738c513e52" providerId="LiveId" clId="{0CEF096C-5FA2-41B3-85F1-F18770715A83}" dt="2019-12-18T05:50:28.700" v="5" actId="5793"/>
+          <ac:spMkLst>
+            <pc:docMk/>
+            <pc:sldMk cId="4087603957" sldId="258"/>
+            <ac:spMk id="3" creationId="{3D779B34-4C18-472D-A7DC-F90E12062737}"/>
+          </ac:spMkLst>
+        </pc:spChg>
+      </pc:sldChg>
+    </pc:docChg>
+  </pc:docChgLst>
+</pc:chgInfo>
 </file>
 
 <file path=ppt/slideLayouts/slideLayout1.xml><?xml version="1.0" encoding="utf-8"?>
@@ -3742,7 +3784,7 @@
         <p:spPr/>
         <p:txBody>
           <a:bodyPr>
-            <a:normAutofit lnSpcReduction="10000"/>
+            <a:normAutofit/>
           </a:bodyPr>
           <a:lstStyle/>
           <a:p>
@@ -3768,17 +3810,8 @@
           <a:p>
             <a:r>
               <a:rPr lang="en-US" dirty="0"/>
-              <a:t>RabbitMQ</a:t>
-            </a:r>
-          </a:p>
-          <a:p>
-            <a:r>
-              <a:rPr lang="en-US" dirty="0"/>
               <a:t>Docker</a:t>
             </a:r>
-          </a:p>
-          <a:p>
-            <a:endParaRPr lang="en-US" dirty="0"/>
           </a:p>
           <a:p>
             <a:r>
@@ -3855,7 +3888,7 @@
                                         <p:tgtEl>
                                           <p:spTgt spid="3">
                                             <p:txEl>
-                                              <p:pRg st="6" end="6"/>
+                                              <p:pRg st="4" end="4"/>
                                             </p:txEl>
                                           </p:spTgt>
                                         </p:tgtEl>
@@ -3873,7 +3906,7 @@
                                         <p:tgtEl>
                                           <p:spTgt spid="3">
                                             <p:txEl>
-                                              <p:pRg st="6" end="6"/>
+                                              <p:pRg st="4" end="4"/>
                                             </p:txEl>
                                           </p:spTgt>
                                         </p:tgtEl>
@@ -3900,7 +3933,7 @@
                                         <p:tgtEl>
                                           <p:spTgt spid="3">
                                             <p:txEl>
-                                              <p:pRg st="6" end="6"/>
+                                              <p:pRg st="4" end="4"/>
                                             </p:txEl>
                                           </p:spTgt>
                                         </p:tgtEl>
@@ -3940,7 +3973,7 @@
                                         <p:tgtEl>
                                           <p:spTgt spid="3">
                                             <p:txEl>
-                                              <p:pRg st="7" end="7"/>
+                                              <p:pRg st="5" end="5"/>
                                             </p:txEl>
                                           </p:spTgt>
                                         </p:tgtEl>
@@ -3958,7 +3991,7 @@
                                         <p:tgtEl>
                                           <p:spTgt spid="3">
                                             <p:txEl>
-                                              <p:pRg st="7" end="7"/>
+                                              <p:pRg st="5" end="5"/>
                                             </p:txEl>
                                           </p:spTgt>
                                         </p:tgtEl>
@@ -3985,7 +4018,7 @@
                                         <p:tgtEl>
                                           <p:spTgt spid="3">
                                             <p:txEl>
-                                              <p:pRg st="7" end="7"/>
+                                              <p:pRg st="5" end="5"/>
                                             </p:txEl>
                                           </p:spTgt>
                                         </p:tgtEl>
@@ -4025,7 +4058,7 @@
                                         <p:tgtEl>
                                           <p:spTgt spid="3">
                                             <p:txEl>
-                                              <p:pRg st="8" end="8"/>
+                                              <p:pRg st="6" end="6"/>
                                             </p:txEl>
                                           </p:spTgt>
                                         </p:tgtEl>
@@ -4043,7 +4076,7 @@
                                         <p:tgtEl>
                                           <p:spTgt spid="3">
                                             <p:txEl>
-                                              <p:pRg st="8" end="8"/>
+                                              <p:pRg st="6" end="6"/>
                                             </p:txEl>
                                           </p:spTgt>
                                         </p:tgtEl>
@@ -4070,7 +4103,7 @@
                                         <p:tgtEl>
                                           <p:spTgt spid="3">
                                             <p:txEl>
-                                              <p:pRg st="8" end="8"/>
+                                              <p:pRg st="6" end="6"/>
                                             </p:txEl>
                                           </p:spTgt>
                                         </p:tgtEl>

</xml_diff>